<commit_message>
feat: fix speaker attribution, live speaking distribution, camera-off detection, parallel name extraction
- Revert piggyback name extraction; restore parallel extract_names_from_frame calls
- Add bucket-based speaker attribution (10s windows with 2x dominance requirement)
- Add deferred speaker attribution at finalize using complete speaking timeline
- Add visual speaking count fallback for live speaking distribution chart
- Inject camera-off participants into signals with default passive entries
- Fix _first_name to preserve "Person N" labels
- Add DB cleanup (DELETE before INSERT) to prevent duplicate participants
- Improve PDF/CSV export with proper data, 11-page report
- Glass UI updates, streaming progress, smart cascade across frontend

Co-Authored-By: Claude Opus 4.6 <noreply@anthropic.com>
</commit_message>
<xml_diff>
--- a/InsightAI_Demo_Final.pptx
+++ b/InsightAI_Demo_Final.pptx
@@ -481,6 +481,90 @@
 </file>
 
 <file path=ppt/notesSlides/notesSlide1.xml><?xml version="1.0" encoding="utf-8"?>
+<p:notes xmlns:a="http://schemas.openxmlformats.org/drawingml/2006/main" xmlns:r="http://schemas.openxmlformats.org/officeDocument/2006/relationships" xmlns:p="http://schemas.openxmlformats.org/presentationml/2006/main">
+  <p:cSld>
+    <p:spTree>
+      <p:nvGrpSpPr>
+        <p:cNvPr id="1" name=""/>
+        <p:cNvGrpSpPr/>
+        <p:nvPr/>
+      </p:nvGrpSpPr>
+      <p:grpSpPr>
+        <a:xfrm>
+          <a:off x="0" y="0"/>
+          <a:ext cx="0" cy="0"/>
+          <a:chOff x="0" y="0"/>
+          <a:chExt cx="0" cy="0"/>
+        </a:xfrm>
+      </p:grpSpPr>
+      <p:sp>
+        <p:nvSpPr>
+          <p:cNvPr id="2" name="Slide Image Placeholder 1"/>
+          <p:cNvSpPr>
+            <a:spLocks noGrp="1" noRot="1" noChangeAspect="1"/>
+          </p:cNvSpPr>
+          <p:nvPr>
+            <p:ph type="sldImg"/>
+          </p:nvPr>
+        </p:nvSpPr>
+        <p:spPr/>
+      </p:sp>
+      <p:sp>
+        <p:nvSpPr>
+          <p:cNvPr id="3" name="Notes Placeholder 2"/>
+          <p:cNvSpPr>
+            <a:spLocks noGrp="1"/>
+          </p:cNvSpPr>
+          <p:nvPr>
+            <p:ph type="body" idx="1"/>
+          </p:nvPr>
+        </p:nvSpPr>
+        <p:spPr/>
+        <p:txBody>
+          <a:bodyPr/>
+          <a:lstStyle/>
+          <a:p>
+            <a:endParaRPr lang="en-AE" dirty="0"/>
+          </a:p>
+        </p:txBody>
+      </p:sp>
+      <p:sp>
+        <p:nvSpPr>
+          <p:cNvPr id="4" name="Slide Number Placeholder 3"/>
+          <p:cNvSpPr>
+            <a:spLocks noGrp="1"/>
+          </p:cNvSpPr>
+          <p:nvPr>
+            <p:ph type="sldNum" sz="quarter" idx="5"/>
+          </p:nvPr>
+        </p:nvSpPr>
+        <p:spPr/>
+        <p:txBody>
+          <a:bodyPr/>
+          <a:lstStyle/>
+          <a:p>
+            <a:fld id="{40600634-805C-DC46-BA2E-AC20C2D5907E}" type="slidenum">
+              <a:rPr lang="en-AE" smtClean="0"/>
+              <a:t>1</a:t>
+            </a:fld>
+            <a:endParaRPr lang="en-AE"/>
+          </a:p>
+        </p:txBody>
+      </p:sp>
+    </p:spTree>
+    <p:extLst>
+      <p:ext uri="{BB962C8B-B14F-4D97-AF65-F5344CB8AC3E}">
+        <p14:creationId xmlns:p14="http://schemas.microsoft.com/office/powerpoint/2010/main" val="3561009043"/>
+      </p:ext>
+    </p:extLst>
+  </p:cSld>
+  <p:clrMapOvr>
+    <a:masterClrMapping/>
+  </p:clrMapOvr>
+</p:notes>
+</file>
+
+<file path=ppt/notesSlides/notesSlide2.xml><?xml version="1.0" encoding="utf-8"?>
 <p:notes xmlns:a="http://schemas.openxmlformats.org/drawingml/2006/main" xmlns:r="http://schemas.openxmlformats.org/officeDocument/2006/relationships" xmlns:p="http://schemas.openxmlformats.org/presentationml/2006/main">
   <p:cSld>
     <p:spTree>
@@ -3710,8 +3794,10 @@
               </a:defRPr>
             </a:pPr>
             <a:r>
+              <a:rPr dirty="0" err="1"/>
               <a:t>InsightAI</a:t>
             </a:r>
+            <a:endParaRPr dirty="0"/>
           </a:p>
         </p:txBody>
       </p:sp>
@@ -3823,11 +3909,21 @@
               <a:rPr dirty="0">
                 <a:solidFill>
                   <a:schemeClr val="bg1">
+                    <a:lumMod val="75000"/>
+                  </a:schemeClr>
+                </a:solidFill>
+              </a:rPr>
+              <a:t>Video</a:t>
+            </a:r>
+            <a:r>
+              <a:rPr dirty="0">
+                <a:solidFill>
+                  <a:schemeClr val="bg1">
                     <a:lumMod val="85000"/>
                   </a:schemeClr>
                 </a:solidFill>
               </a:rPr>
-              <a:t>Video  +  Audio  +  Text  →  Engagement  |  Coaching  |  Actionable Insights</a:t>
+              <a:t>  +  Audio  +  Text  →  Engagement  |  Coaching  |  Actionable Insights</a:t>
             </a:r>
           </a:p>
         </p:txBody>
@@ -3841,7 +3937,7 @@
         <p:spPr>
           <a:xfrm>
             <a:off x="914400" y="5760720"/>
-            <a:ext cx="10058400" cy="365760"/>
+            <a:ext cx="10058400" cy="307777"/>
           </a:xfrm>
           <a:prstGeom prst="rect">
             <a:avLst/>
@@ -3863,8 +3959,55 @@
               </a:defRPr>
             </a:pPr>
             <a:r>
-              <a:rPr dirty="0"/>
+              <a:rPr dirty="0">
+                <a:solidFill>
+                  <a:schemeClr val="bg1">
+                    <a:lumMod val="75000"/>
+                  </a:schemeClr>
+                </a:solidFill>
+              </a:rPr>
               <a:t>Internal POC  •  February 2026</a:t>
+            </a:r>
+          </a:p>
+        </p:txBody>
+      </p:sp>
+      <p:sp>
+        <p:nvSpPr>
+          <p:cNvPr id="7" name="TextBox 6">
+            <a:extLst>
+              <a:ext uri="{FF2B5EF4-FFF2-40B4-BE49-F238E27FC236}">
+                <a16:creationId xmlns:a16="http://schemas.microsoft.com/office/drawing/2014/main" id="{772308DD-B9F0-3FFF-EED3-6B724AB85E42}"/>
+              </a:ext>
+            </a:extLst>
+          </p:cNvPr>
+          <p:cNvSpPr txBox="1"/>
+          <p:nvPr/>
+        </p:nvSpPr>
+        <p:spPr>
+          <a:xfrm>
+            <a:off x="914400" y="5972591"/>
+            <a:ext cx="2249213" cy="307777"/>
+          </a:xfrm>
+          <a:prstGeom prst="rect">
+            <a:avLst/>
+          </a:prstGeom>
+          <a:noFill/>
+        </p:spPr>
+        <p:txBody>
+          <a:bodyPr wrap="square" rtlCol="0">
+            <a:spAutoFit/>
+          </a:bodyPr>
+          <a:lstStyle/>
+          <a:p>
+            <a:r>
+              <a:rPr lang="en-AE" sz="1400" b="1" dirty="0">
+                <a:solidFill>
+                  <a:schemeClr val="bg1">
+                    <a:lumMod val="75000"/>
+                  </a:schemeClr>
+                </a:solidFill>
+              </a:rPr>
+              <a:t>Presented by : Anup</a:t>
             </a:r>
           </a:p>
         </p:txBody>

</xml_diff>

<commit_message>
chore: add offline START.md, change offline ports to 9000/4000, fix Python 3.9 compat
- Offline backend: port 8001 → 9000
- Offline frontend: port 5174 → 4000
- Add from __future__ import annotations to export.py for Python 3.9
- Add simpleem-offline/START.md with startup commands

Co-Authored-By: Claude Opus 4.6 <noreply@anthropic.com>
</commit_message>
<xml_diff>
--- a/InsightAI_Demo_Final.pptx
+++ b/InsightAI_Demo_Final.pptx
@@ -212,7 +212,7 @@
           <a:p>
             <a:fld id="{57101772-411D-AB48-A31E-752D5CA064A9}" type="datetimeFigureOut">
               <a:rPr lang="en-AE" smtClean="0"/>
-              <a:t>19/02/2026</a:t>
+              <a:t>21/02/2026</a:t>
             </a:fld>
             <a:endParaRPr lang="en-AE"/>
           </a:p>
@@ -524,6 +524,50 @@
           <a:bodyPr/>
           <a:lstStyle/>
           <a:p>
+            <a:r>
+              <a:rPr lang="en-US" dirty="0"/>
+              <a:t>Opening:                                                                                                                    </a:t>
+            </a:r>
+          </a:p>
+          <a:p>
+            <a:r>
+              <a:rPr lang="en-US" dirty="0"/>
+              <a:t>  - "Thank you everyone for joining. I'm Anup, and today I want to show you something we've been building — </a:t>
+            </a:r>
+            <a:r>
+              <a:rPr lang="en-US" dirty="0" err="1"/>
+              <a:t>InsightAI</a:t>
+            </a:r>
+            <a:r>
+              <a:rPr lang="en-US" dirty="0"/>
+              <a:t>."</a:t>
+            </a:r>
+          </a:p>
+          <a:p>
+            <a:r>
+              <a:rPr lang="en-US" dirty="0"/>
+              <a:t>  - "The core idea is simple: meetings are multimodal — people communicate through their face, their voice, and their words. But every</a:t>
+            </a:r>
+          </a:p>
+          <a:p>
+            <a:r>
+              <a:rPr lang="en-US" dirty="0"/>
+              <a:t>  tool on the market today only analyzes the transcript. We built something that analyzes all three channels together."</a:t>
+            </a:r>
+          </a:p>
+          <a:p>
+            <a:r>
+              <a:rPr lang="en-US" dirty="0"/>
+              <a:t>  - "This is powered entirely by Core42 Compass — no local GPUs, no on-prem infrastructure. Pure cloud API."</a:t>
+            </a:r>
+          </a:p>
+          <a:p>
+            <a:r>
+              <a:rPr lang="en-US" dirty="0"/>
+              <a:t>  - "What you'll see today is a working POC — not slides, not mockups — a real system analyzing a real meeting recording."</a:t>
+            </a:r>
+          </a:p>
+          <a:p>
             <a:endParaRPr lang="en-AE" dirty="0"/>
           </a:p>
         </p:txBody>
@@ -608,6 +652,48 @@
           <a:bodyPr/>
           <a:lstStyle/>
           <a:p>
+            <a:r>
+              <a:rPr lang="en-US" dirty="0"/>
+              <a:t>- "Let me set the context. 93% of communication is non-verbal — that's decades of research from Mehrabian and others. Yet tools like</a:t>
+            </a:r>
+          </a:p>
+          <a:p>
+            <a:r>
+              <a:rPr lang="en-US" dirty="0"/>
+              <a:t>  Gong and Chorus throw away 93% of the signal and only analyze the transcript."</a:t>
+            </a:r>
+          </a:p>
+          <a:p>
+            <a:r>
+              <a:rPr lang="en-US" dirty="0"/>
+              <a:t>  - "Second problem — coaching is always retroactive. A manager reviews a call 3 days later, writes feedback nobody reads. By then the</a:t>
+            </a:r>
+          </a:p>
+          <a:p>
+            <a:r>
+              <a:rPr lang="en-US" dirty="0"/>
+              <a:t>  deal is cold or the candidate took another offer. What if the system could coach you during the conversation?"</a:t>
+            </a:r>
+          </a:p>
+          <a:p>
+            <a:r>
+              <a:rPr lang="en-US" dirty="0"/>
+              <a:t>  - "Third — even when these tools give scores, they're black boxes. A rep gets a 62 but has no idea what specific behavior dragged them</a:t>
+            </a:r>
+          </a:p>
+          <a:p>
+            <a:r>
+              <a:rPr lang="en-US" dirty="0"/>
+              <a:t>  down. Was it their energy? Their body language? Their pacing? Without that granularity, scores are useless."</a:t>
+            </a:r>
+          </a:p>
+          <a:p>
+            <a:r>
+              <a:rPr lang="en-US" dirty="0"/>
+              <a:t>  - "The gap in the market is clear: we need something that watches, listens, AND reads — and explains its reasoning in real time."</a:t>
+            </a:r>
+          </a:p>
+          <a:p>
             <a:endParaRPr lang="en-AE" dirty="0"/>
           </a:p>
         </p:txBody>
@@ -629,6 +715,344 @@
           <a:p>
             <a:fld id="{40600634-805C-DC46-BA2E-AC20C2D5907E}" type="slidenum">
               <a:rPr lang="en-AE" smtClean="0"/>
+              <a:t>2</a:t>
+            </a:fld>
+            <a:endParaRPr lang="en-AE"/>
+          </a:p>
+        </p:txBody>
+      </p:sp>
+    </p:spTree>
+    <p:extLst>
+      <p:ext uri="{BB962C8B-B14F-4D97-AF65-F5344CB8AC3E}">
+        <p14:creationId xmlns:p14="http://schemas.microsoft.com/office/powerpoint/2010/main" val="1141858894"/>
+      </p:ext>
+    </p:extLst>
+  </p:cSld>
+  <p:clrMapOvr>
+    <a:masterClrMapping/>
+  </p:clrMapOvr>
+</p:notes>
+</file>
+
+<file path=ppt/notesSlides/notesSlide3.xml><?xml version="1.0" encoding="utf-8"?>
+<p:notes xmlns:a="http://schemas.openxmlformats.org/drawingml/2006/main" xmlns:r="http://schemas.openxmlformats.org/officeDocument/2006/relationships" xmlns:p="http://schemas.openxmlformats.org/presentationml/2006/main">
+  <p:cSld>
+    <p:spTree>
+      <p:nvGrpSpPr>
+        <p:cNvPr id="1" name=""/>
+        <p:cNvGrpSpPr/>
+        <p:nvPr/>
+      </p:nvGrpSpPr>
+      <p:grpSpPr>
+        <a:xfrm>
+          <a:off x="0" y="0"/>
+          <a:ext cx="0" cy="0"/>
+          <a:chOff x="0" y="0"/>
+          <a:chExt cx="0" cy="0"/>
+        </a:xfrm>
+      </p:grpSpPr>
+      <p:sp>
+        <p:nvSpPr>
+          <p:cNvPr id="2" name="Slide Image Placeholder 1"/>
+          <p:cNvSpPr>
+            <a:spLocks noGrp="1" noRot="1" noChangeAspect="1"/>
+          </p:cNvSpPr>
+          <p:nvPr>
+            <p:ph type="sldImg"/>
+          </p:nvPr>
+        </p:nvSpPr>
+        <p:spPr/>
+      </p:sp>
+      <p:sp>
+        <p:nvSpPr>
+          <p:cNvPr id="3" name="Notes Placeholder 2"/>
+          <p:cNvSpPr>
+            <a:spLocks noGrp="1"/>
+          </p:cNvSpPr>
+          <p:nvPr>
+            <p:ph type="body" idx="1"/>
+          </p:nvPr>
+        </p:nvSpPr>
+        <p:spPr/>
+        <p:txBody>
+          <a:bodyPr/>
+          <a:lstStyle/>
+          <a:p>
+            <a:r>
+              <a:rPr lang="en-US" dirty="0"/>
+              <a:t> Architecture :</a:t>
+            </a:r>
+          </a:p>
+          <a:p>
+            <a:r>
+              <a:rPr lang="en-US" dirty="0"/>
+              <a:t>  - "So here's what </a:t>
+            </a:r>
+            <a:r>
+              <a:rPr lang="en-US" dirty="0" err="1"/>
+              <a:t>InsightAI</a:t>
+            </a:r>
+            <a:r>
+              <a:rPr lang="en-US" dirty="0"/>
+              <a:t> does. Three input channels fuse into one intelligence layer."</a:t>
+            </a:r>
+          </a:p>
+          <a:p>
+            <a:r>
+              <a:rPr lang="en-US" dirty="0"/>
+              <a:t>  - "Visual channel — we extract frames from the video and use GPT-4o Vision to analyze facial expressions, posture, gestures, eye</a:t>
+            </a:r>
+          </a:p>
+          <a:p>
+            <a:r>
+              <a:rPr lang="en-US" dirty="0"/>
+              <a:t>  contact, energy. This happens frame by frame, per participant."</a:t>
+            </a:r>
+          </a:p>
+          <a:p>
+            <a:r>
+              <a:rPr lang="en-US" dirty="0"/>
+              <a:t>  - "Audio channel — we use Whisper for transcription, then analyze pitch, volume, speaking pace, pauses. We can tell if someone's energy</a:t>
+            </a:r>
+          </a:p>
+          <a:p>
+            <a:r>
+              <a:rPr lang="en-US" dirty="0"/>
+              <a:t>  is dropping or if they're speaking too fast."</a:t>
+            </a:r>
+          </a:p>
+          <a:p>
+            <a:r>
+              <a:rPr lang="en-US" dirty="0"/>
+              <a:t>  - "Text channel — full transcript intelligence: topics, sentiment, objections, questions, action items. Not just what was said, but the</a:t>
+            </a:r>
+          </a:p>
+          <a:p>
+            <a:r>
+              <a:rPr lang="en-US" dirty="0"/>
+              <a:t>  intent behind it."</a:t>
+            </a:r>
+          </a:p>
+          <a:p>
+            <a:r>
+              <a:rPr lang="en-US" dirty="0"/>
+              <a:t>  - "These three channels fuse together to produce engagement scores that are explained — not just a number, but the specific signals that</a:t>
+            </a:r>
+          </a:p>
+          <a:p>
+            <a:r>
+              <a:rPr lang="en-US" dirty="0"/>
+              <a:t>   drove it. Plus smart coaching, auto-generated summaries, and a full PDF report."</a:t>
+            </a:r>
+          </a:p>
+          <a:p>
+            <a:r>
+              <a:rPr lang="en-US" dirty="0"/>
+              <a:t>  - "Two modes — real-time analysis during playback where you see signals update live, and deep batch analysis for maximum accuracy."</a:t>
+            </a:r>
+          </a:p>
+          <a:p>
+            <a:r>
+              <a:rPr lang="en-US" dirty="0"/>
+              <a:t>  - "And the key technical point: this runs 100% on Core42 Compass cloud APIs. No GPU cluster, no model hosting. We call the API, it</a:t>
+            </a:r>
+          </a:p>
+          <a:p>
+            <a:r>
+              <a:rPr lang="en-US" dirty="0"/>
+              <a:t>  returns analysis. That's the power of the Compass platform."</a:t>
+            </a:r>
+            <a:endParaRPr lang="en-AE" dirty="0"/>
+          </a:p>
+        </p:txBody>
+      </p:sp>
+      <p:sp>
+        <p:nvSpPr>
+          <p:cNvPr id="4" name="Slide Number Placeholder 3"/>
+          <p:cNvSpPr>
+            <a:spLocks noGrp="1"/>
+          </p:cNvSpPr>
+          <p:nvPr>
+            <p:ph type="sldNum" sz="quarter" idx="5"/>
+          </p:nvPr>
+        </p:nvSpPr>
+        <p:spPr/>
+        <p:txBody>
+          <a:bodyPr/>
+          <a:lstStyle/>
+          <a:p>
+            <a:fld id="{40600634-805C-DC46-BA2E-AC20C2D5907E}" type="slidenum">
+              <a:rPr lang="en-AE" smtClean="0"/>
+              <a:t>3</a:t>
+            </a:fld>
+            <a:endParaRPr lang="en-AE"/>
+          </a:p>
+        </p:txBody>
+      </p:sp>
+    </p:spTree>
+    <p:extLst>
+      <p:ext uri="{BB962C8B-B14F-4D97-AF65-F5344CB8AC3E}">
+        <p14:creationId xmlns:p14="http://schemas.microsoft.com/office/powerpoint/2010/main" val="1917329244"/>
+      </p:ext>
+    </p:extLst>
+  </p:cSld>
+  <p:clrMapOvr>
+    <a:masterClrMapping/>
+  </p:clrMapOvr>
+</p:notes>
+</file>
+
+<file path=ppt/notesSlides/notesSlide4.xml><?xml version="1.0" encoding="utf-8"?>
+<p:notes xmlns:a="http://schemas.openxmlformats.org/drawingml/2006/main" xmlns:r="http://schemas.openxmlformats.org/officeDocument/2006/relationships" xmlns:p="http://schemas.openxmlformats.org/presentationml/2006/main">
+  <p:cSld>
+    <p:spTree>
+      <p:nvGrpSpPr>
+        <p:cNvPr id="1" name=""/>
+        <p:cNvGrpSpPr/>
+        <p:nvPr/>
+      </p:nvGrpSpPr>
+      <p:grpSpPr>
+        <a:xfrm>
+          <a:off x="0" y="0"/>
+          <a:ext cx="0" cy="0"/>
+          <a:chOff x="0" y="0"/>
+          <a:chExt cx="0" cy="0"/>
+        </a:xfrm>
+      </p:grpSpPr>
+      <p:sp>
+        <p:nvSpPr>
+          <p:cNvPr id="2" name="Slide Image Placeholder 1"/>
+          <p:cNvSpPr>
+            <a:spLocks noGrp="1" noRot="1" noChangeAspect="1"/>
+          </p:cNvSpPr>
+          <p:nvPr>
+            <p:ph type="sldImg"/>
+          </p:nvPr>
+        </p:nvSpPr>
+        <p:spPr/>
+      </p:sp>
+      <p:sp>
+        <p:nvSpPr>
+          <p:cNvPr id="3" name="Notes Placeholder 2"/>
+          <p:cNvSpPr>
+            <a:spLocks noGrp="1"/>
+          </p:cNvSpPr>
+          <p:nvPr>
+            <p:ph type="body" idx="1"/>
+          </p:nvPr>
+        </p:nvSpPr>
+        <p:spPr/>
+        <p:txBody>
+          <a:bodyPr/>
+          <a:lstStyle/>
+          <a:p>
+            <a:r>
+              <a:rPr lang="en-US" dirty="0"/>
+              <a:t> Strategic Vision :</a:t>
+            </a:r>
+          </a:p>
+          <a:p>
+            <a:r>
+              <a:rPr lang="en-US" dirty="0"/>
+              <a:t>  - "Now I want to zoom out for a moment. What we built is a multimodal analysis engine — but the real opportunity is much bigger."</a:t>
+            </a:r>
+          </a:p>
+          <a:p>
+            <a:r>
+              <a:rPr lang="en-US" dirty="0"/>
+              <a:t>  - "There's no off-the-shelf Artificial Emotional Intelligence model available today. Companies like </a:t>
+            </a:r>
+            <a:r>
+              <a:rPr lang="en-US" dirty="0" err="1"/>
+              <a:t>Simpleem</a:t>
+            </a:r>
+            <a:r>
+              <a:rPr lang="en-US" dirty="0"/>
+              <a:t>, </a:t>
+            </a:r>
+            <a:r>
+              <a:rPr lang="en-US" dirty="0" err="1"/>
+              <a:t>Affectiva</a:t>
+            </a:r>
+            <a:r>
+              <a:rPr lang="en-US" dirty="0"/>
+              <a:t>, Hume AI — they</a:t>
+            </a:r>
+          </a:p>
+          <a:p>
+            <a:r>
+              <a:rPr lang="en-US" dirty="0"/>
+              <a:t>  all keep their models proprietary. We bridged this gap by combining general-purpose models, but training a dedicated AEI model is the</a:t>
+            </a:r>
+          </a:p>
+          <a:p>
+            <a:r>
+              <a:rPr lang="en-US" dirty="0"/>
+              <a:t>  strategic next step."</a:t>
+            </a:r>
+          </a:p>
+          <a:p>
+            <a:r>
+              <a:rPr lang="en-US" dirty="0"/>
+              <a:t>  - "Where could this engine go? Sales — imagine predicting deal outcomes not from CRM data but from how the rep actually behaved on the</a:t>
+            </a:r>
+          </a:p>
+          <a:p>
+            <a:r>
+              <a:rPr lang="en-US" dirty="0"/>
+              <a:t>  call. HR — reducing interviewer bias with objective behavioral data instead of gut feelings. Training — measuring engagement in</a:t>
+            </a:r>
+          </a:p>
+          <a:p>
+            <a:r>
+              <a:rPr lang="en-US" dirty="0"/>
+              <a:t>  real-time during onboarding sessions."</a:t>
+            </a:r>
+          </a:p>
+          <a:p>
+            <a:r>
+              <a:rPr lang="en-US" dirty="0"/>
+              <a:t>  - "Customer Success — detecting churn risk from call sentiment before the customer even complains. Healthcare — tracking patient</a:t>
+            </a:r>
+          </a:p>
+          <a:p>
+            <a:r>
+              <a:rPr lang="en-US" dirty="0"/>
+              <a:t>  emotional state during telehealth. Leadership — measuring inclusion and team dynamics in real meetings."</a:t>
+            </a:r>
+          </a:p>
+          <a:p>
+            <a:r>
+              <a:rPr lang="en-US" dirty="0"/>
+              <a:t>  - "This is out of scope for today's demo — but I want to plant the seed. A dedicated AEI model trained on this data is a strategic asset</a:t>
+            </a:r>
+          </a:p>
+          <a:p>
+            <a:r>
+              <a:rPr lang="en-US" dirty="0"/>
+              <a:t>   worth a separate conversation."</a:t>
+            </a:r>
+            <a:endParaRPr lang="en-AE" dirty="0"/>
+          </a:p>
+        </p:txBody>
+      </p:sp>
+      <p:sp>
+        <p:nvSpPr>
+          <p:cNvPr id="4" name="Slide Number Placeholder 3"/>
+          <p:cNvSpPr>
+            <a:spLocks noGrp="1"/>
+          </p:cNvSpPr>
+          <p:nvPr>
+            <p:ph type="sldNum" sz="quarter" idx="5"/>
+          </p:nvPr>
+        </p:nvSpPr>
+        <p:spPr/>
+        <p:txBody>
+          <a:bodyPr/>
+          <a:lstStyle/>
+          <a:p>
+            <a:fld id="{40600634-805C-DC46-BA2E-AC20C2D5907E}" type="slidenum">
+              <a:rPr lang="en-AE" smtClean="0"/>
               <a:t>4</a:t>
             </a:fld>
             <a:endParaRPr lang="en-AE"/>
@@ -639,6 +1063,148 @@
     <p:extLst>
       <p:ext uri="{BB962C8B-B14F-4D97-AF65-F5344CB8AC3E}">
         <p14:creationId xmlns:p14="http://schemas.microsoft.com/office/powerpoint/2010/main" val="468992633"/>
+      </p:ext>
+    </p:extLst>
+  </p:cSld>
+  <p:clrMapOvr>
+    <a:masterClrMapping/>
+  </p:clrMapOvr>
+</p:notes>
+</file>
+
+<file path=ppt/notesSlides/notesSlide5.xml><?xml version="1.0" encoding="utf-8"?>
+<p:notes xmlns:a="http://schemas.openxmlformats.org/drawingml/2006/main" xmlns:r="http://schemas.openxmlformats.org/officeDocument/2006/relationships" xmlns:p="http://schemas.openxmlformats.org/presentationml/2006/main">
+  <p:cSld>
+    <p:spTree>
+      <p:nvGrpSpPr>
+        <p:cNvPr id="1" name=""/>
+        <p:cNvGrpSpPr/>
+        <p:nvPr/>
+      </p:nvGrpSpPr>
+      <p:grpSpPr>
+        <a:xfrm>
+          <a:off x="0" y="0"/>
+          <a:ext cx="0" cy="0"/>
+          <a:chOff x="0" y="0"/>
+          <a:chExt cx="0" cy="0"/>
+        </a:xfrm>
+      </p:grpSpPr>
+      <p:sp>
+        <p:nvSpPr>
+          <p:cNvPr id="2" name="Slide Image Placeholder 1"/>
+          <p:cNvSpPr>
+            <a:spLocks noGrp="1" noRot="1" noChangeAspect="1"/>
+          </p:cNvSpPr>
+          <p:nvPr>
+            <p:ph type="sldImg"/>
+          </p:nvPr>
+        </p:nvSpPr>
+        <p:spPr/>
+      </p:sp>
+      <p:sp>
+        <p:nvSpPr>
+          <p:cNvPr id="3" name="Notes Placeholder 2"/>
+          <p:cNvSpPr>
+            <a:spLocks noGrp="1"/>
+          </p:cNvSpPr>
+          <p:nvPr>
+            <p:ph type="body" idx="1"/>
+          </p:nvPr>
+        </p:nvSpPr>
+        <p:spPr/>
+        <p:txBody>
+          <a:bodyPr/>
+          <a:lstStyle/>
+          <a:p>
+            <a:r>
+              <a:rPr lang="en-US" dirty="0"/>
+              <a:t>- "Alright, let me show you the real thing. Here's what you're about to see in the live demo."</a:t>
+            </a:r>
+          </a:p>
+          <a:p>
+            <a:r>
+              <a:rPr lang="en-US" dirty="0"/>
+              <a:t>  - "First, I'll upload a meeting recording and you'll watch the AI process it in real time — you'll see the analysis stages progress."</a:t>
+            </a:r>
+          </a:p>
+          <a:p>
+            <a:r>
+              <a:rPr lang="en-US" dirty="0"/>
+              <a:t>  - "Then the dashboard — per-participant scores for engagement, sentiment, energy. A speaking distribution chart showing who dominated</a:t>
+            </a:r>
+          </a:p>
+          <a:p>
+            <a:r>
+              <a:rPr lang="en-US" dirty="0"/>
+              <a:t>  the conversation."</a:t>
+            </a:r>
+          </a:p>
+          <a:p>
+            <a:r>
+              <a:rPr lang="en-US" dirty="0"/>
+              <a:t>  - "We'll dive into individual signals — emotion timelines, body language trends, voice metrics. You'll see exactly why each person got</a:t>
+            </a:r>
+          </a:p>
+          <a:p>
+            <a:r>
+              <a:rPr lang="en-US" dirty="0"/>
+              <a:t>  their score."</a:t>
+            </a:r>
+          </a:p>
+          <a:p>
+            <a:r>
+              <a:rPr lang="en-US" dirty="0"/>
+              <a:t>  - "Then the meeting intelligence layer — AI-generated summary, action items, decisions, follow-ups. And coaching tips flagged at</a:t>
+            </a:r>
+          </a:p>
+          <a:p>
+            <a:r>
+              <a:rPr lang="en-US" dirty="0"/>
+              <a:t>  specific moments in the timeline."</a:t>
+            </a:r>
+          </a:p>
+          <a:p>
+            <a:r>
+              <a:rPr lang="en-US" dirty="0"/>
+              <a:t>  - "Finally, one-click export — a full PDF report you could hand to a stakeholder today."</a:t>
+            </a:r>
+          </a:p>
+          <a:p>
+            <a:r>
+              <a:rPr lang="en-US" dirty="0"/>
+              <a:t>  - "Let's switch to the app and see it live."</a:t>
+            </a:r>
+            <a:endParaRPr lang="en-AE" dirty="0"/>
+          </a:p>
+        </p:txBody>
+      </p:sp>
+      <p:sp>
+        <p:nvSpPr>
+          <p:cNvPr id="4" name="Slide Number Placeholder 3"/>
+          <p:cNvSpPr>
+            <a:spLocks noGrp="1"/>
+          </p:cNvSpPr>
+          <p:nvPr>
+            <p:ph type="sldNum" sz="quarter" idx="5"/>
+          </p:nvPr>
+        </p:nvSpPr>
+        <p:spPr/>
+        <p:txBody>
+          <a:bodyPr/>
+          <a:lstStyle/>
+          <a:p>
+            <a:fld id="{40600634-805C-DC46-BA2E-AC20C2D5907E}" type="slidenum">
+              <a:rPr lang="en-AE" smtClean="0"/>
+              <a:t>5</a:t>
+            </a:fld>
+            <a:endParaRPr lang="en-AE"/>
+          </a:p>
+        </p:txBody>
+      </p:sp>
+    </p:spTree>
+    <p:extLst>
+      <p:ext uri="{BB962C8B-B14F-4D97-AF65-F5344CB8AC3E}">
+        <p14:creationId xmlns:p14="http://schemas.microsoft.com/office/powerpoint/2010/main" val="3500520352"/>
       </p:ext>
     </p:extLst>
   </p:cSld>
@@ -827,7 +1393,7 @@
           <a:p>
             <a:fld id="{5BCAD085-E8A6-8845-BD4E-CB4CCA059FC4}" type="datetimeFigureOut">
               <a:rPr lang="en-US" smtClean="0"/>
-              <a:t>2/19/26</a:t>
+              <a:t>2/21/26</a:t>
             </a:fld>
             <a:endParaRPr lang="en-US"/>
           </a:p>
@@ -995,7 +1561,7 @@
           <a:p>
             <a:fld id="{5BCAD085-E8A6-8845-BD4E-CB4CCA059FC4}" type="datetimeFigureOut">
               <a:rPr lang="en-US" smtClean="0"/>
-              <a:t>2/19/26</a:t>
+              <a:t>2/21/26</a:t>
             </a:fld>
             <a:endParaRPr lang="en-US"/>
           </a:p>
@@ -1173,7 +1739,7 @@
           <a:p>
             <a:fld id="{5BCAD085-E8A6-8845-BD4E-CB4CCA059FC4}" type="datetimeFigureOut">
               <a:rPr lang="en-US" smtClean="0"/>
-              <a:t>2/19/26</a:t>
+              <a:t>2/21/26</a:t>
             </a:fld>
             <a:endParaRPr lang="en-US"/>
           </a:p>
@@ -1341,7 +1907,7 @@
           <a:p>
             <a:fld id="{5BCAD085-E8A6-8845-BD4E-CB4CCA059FC4}" type="datetimeFigureOut">
               <a:rPr lang="en-US" smtClean="0"/>
-              <a:t>2/19/26</a:t>
+              <a:t>2/21/26</a:t>
             </a:fld>
             <a:endParaRPr lang="en-US"/>
           </a:p>
@@ -1586,7 +2152,7 @@
           <a:p>
             <a:fld id="{5BCAD085-E8A6-8845-BD4E-CB4CCA059FC4}" type="datetimeFigureOut">
               <a:rPr lang="en-US" smtClean="0"/>
-              <a:t>2/19/26</a:t>
+              <a:t>2/21/26</a:t>
             </a:fld>
             <a:endParaRPr lang="en-US"/>
           </a:p>
@@ -1871,7 +2437,7 @@
           <a:p>
             <a:fld id="{5BCAD085-E8A6-8845-BD4E-CB4CCA059FC4}" type="datetimeFigureOut">
               <a:rPr lang="en-US" smtClean="0"/>
-              <a:t>2/19/26</a:t>
+              <a:t>2/21/26</a:t>
             </a:fld>
             <a:endParaRPr lang="en-US"/>
           </a:p>
@@ -2290,7 +2856,7 @@
           <a:p>
             <a:fld id="{5BCAD085-E8A6-8845-BD4E-CB4CCA059FC4}" type="datetimeFigureOut">
               <a:rPr lang="en-US" smtClean="0"/>
-              <a:t>2/19/26</a:t>
+              <a:t>2/21/26</a:t>
             </a:fld>
             <a:endParaRPr lang="en-US"/>
           </a:p>
@@ -2407,7 +2973,7 @@
           <a:p>
             <a:fld id="{5BCAD085-E8A6-8845-BD4E-CB4CCA059FC4}" type="datetimeFigureOut">
               <a:rPr lang="en-US" smtClean="0"/>
-              <a:t>2/19/26</a:t>
+              <a:t>2/21/26</a:t>
             </a:fld>
             <a:endParaRPr lang="en-US"/>
           </a:p>
@@ -2502,7 +3068,7 @@
           <a:p>
             <a:fld id="{5BCAD085-E8A6-8845-BD4E-CB4CCA059FC4}" type="datetimeFigureOut">
               <a:rPr lang="en-US" smtClean="0"/>
-              <a:t>2/19/26</a:t>
+              <a:t>2/21/26</a:t>
             </a:fld>
             <a:endParaRPr lang="en-US"/>
           </a:p>
@@ -2777,7 +3343,7 @@
           <a:p>
             <a:fld id="{5BCAD085-E8A6-8845-BD4E-CB4CCA059FC4}" type="datetimeFigureOut">
               <a:rPr lang="en-US" smtClean="0"/>
-              <a:t>2/19/26</a:t>
+              <a:t>2/21/26</a:t>
             </a:fld>
             <a:endParaRPr lang="en-US"/>
           </a:p>
@@ -3029,7 +3595,7 @@
           <a:p>
             <a:fld id="{5BCAD085-E8A6-8845-BD4E-CB4CCA059FC4}" type="datetimeFigureOut">
               <a:rPr lang="en-US" smtClean="0"/>
-              <a:t>2/19/26</a:t>
+              <a:t>2/21/26</a:t>
             </a:fld>
             <a:endParaRPr lang="en-US"/>
           </a:p>
@@ -3240,7 +3806,7 @@
           <a:p>
             <a:fld id="{5BCAD085-E8A6-8845-BD4E-CB4CCA059FC4}" type="datetimeFigureOut">
               <a:rPr lang="en-US" smtClean="0"/>
-              <a:t>2/19/26</a:t>
+              <a:t>2/21/26</a:t>
             </a:fld>
             <a:endParaRPr lang="en-US"/>
           </a:p>

</xml_diff>

<commit_message>
feat: extract useScreenRecorder hook, add Record button to header, fix audio capture
- Extract useScreenRecorder from AnalysisDashboard into shared hooks/useScreenRecorder.ts
- Add always-visible Record button in App.tsx header (works from any view)
- Fix macOS audio capture: use HTMLMediaElement.captureStream() to grab video
  element audio directly, bypassing getDisplayMedia limitation on macOS
- Add implementation plans for record button feature

Co-Authored-By: Claude Opus 4.6 <noreply@anthropic.com>
</commit_message>
<xml_diff>
--- a/InsightAI_Demo_Final.pptx
+++ b/InsightAI_Demo_Final.pptx
@@ -652,21 +652,23 @@
           <a:bodyPr/>
           <a:lstStyle/>
           <a:p>
+            <a:pPr marL="171450" indent="-171450">
+              <a:buFontTx/>
+              <a:buChar char="-"/>
+            </a:pPr>
             <a:r>
               <a:rPr lang="en-US" dirty="0"/>
-              <a:t>- "Let me set the context. 93% of communication is non-verbal — that's decades of research from Mehrabian and others. Yet tools like</a:t>
-            </a:r>
-          </a:p>
-          <a:p>
+              <a:t>"Let me set the context. 93% of communication is non-verbal — that's decades of research from Mehrabian and others. </a:t>
+            </a:r>
+          </a:p>
+          <a:p>
+            <a:pPr marL="171450" indent="-171450">
+              <a:buFontTx/>
+              <a:buChar char="-"/>
+            </a:pPr>
             <a:r>
               <a:rPr lang="en-US" dirty="0"/>
-              <a:t>  Gong and Chorus throw away 93% of the signal and only analyze the transcript."</a:t>
-            </a:r>
-          </a:p>
-          <a:p>
-            <a:r>
-              <a:rPr lang="en-US" dirty="0"/>
-              <a:t>  - "Second problem — coaching is always retroactive. A manager reviews a call 3 days later, writes feedback nobody reads. By then the</a:t>
+              <a:t>"Second problem — coaching is always retroactive. A manager reviews a call 3 days later, writes feedback nobody reads. By then the</a:t>
             </a:r>
           </a:p>
           <a:p>
@@ -8026,8 +8028,8 @@
         </p:nvSpPr>
         <p:spPr>
           <a:xfrm>
-            <a:off x="4663440" y="2743200"/>
-            <a:ext cx="2743200" cy="822960"/>
+            <a:off x="4541520" y="2743200"/>
+            <a:ext cx="3108960" cy="692497"/>
           </a:xfrm>
           <a:prstGeom prst="rect">
             <a:avLst/>

</xml_diff>